<commit_message>
Add create and insert samples to presentation
</commit_message>
<xml_diff>
--- a/Hospital Management System.pptx
+++ b/Hospital Management System.pptx
@@ -5,7 +5,7 @@
     <p:sldMasterId id="2147483648" r:id="rId1"/>
   </p:sldMasterIdLst>
   <p:notesMasterIdLst>
-    <p:notesMasterId r:id="rId15"/>
+    <p:notesMasterId r:id="rId17"/>
   </p:notesMasterIdLst>
   <p:sldIdLst>
     <p:sldId id="256" r:id="rId2"/>
@@ -18,9 +18,11 @@
     <p:sldId id="265" r:id="rId9"/>
     <p:sldId id="264" r:id="rId10"/>
     <p:sldId id="266" r:id="rId11"/>
-    <p:sldId id="267" r:id="rId12"/>
-    <p:sldId id="268" r:id="rId13"/>
-    <p:sldId id="269" r:id="rId14"/>
+    <p:sldId id="271" r:id="rId12"/>
+    <p:sldId id="270" r:id="rId13"/>
+    <p:sldId id="267" r:id="rId14"/>
+    <p:sldId id="268" r:id="rId15"/>
+    <p:sldId id="269" r:id="rId16"/>
   </p:sldIdLst>
   <p:sldSz cx="12192000" cy="6858000"/>
   <p:notesSz cx="6858000" cy="9144000"/>
@@ -119,6 +121,11 @@
       </a:defRPr>
     </a:lvl9pPr>
   </p:defaultTextStyle>
+  <p:extLst>
+    <p:ext uri="{EFAFB233-063F-42B5-8137-9DF3F51BA10A}">
+      <p15:sldGuideLst xmlns:p15="http://schemas.microsoft.com/office/powerpoint/2012/main"/>
+    </p:ext>
+  </p:extLst>
 </p:presentation>
 </file>
 
@@ -1349,7 +1356,7 @@
           <a:p>
             <a:fld id="{797E8101-A9D6-46E4-9371-61C7B602B9D9}" type="slidenum">
               <a:rPr lang="en-US" smtClean="0"/>
-              <a:t>11</a:t>
+              <a:t>13</a:t>
             </a:fld>
             <a:endParaRPr lang="en-US"/>
           </a:p>
@@ -1515,7 +1522,7 @@
           <a:p>
             <a:fld id="{A82FF8FB-BF00-4018-AA56-1449D5B996A5}" type="datetimeFigureOut">
               <a:rPr lang="en-US" smtClean="0"/>
-              <a:t>12/9/2024</a:t>
+              <a:t>12/10/2024</a:t>
             </a:fld>
             <a:endParaRPr lang="en-US"/>
           </a:p>
@@ -1713,7 +1720,7 @@
           <a:p>
             <a:fld id="{A82FF8FB-BF00-4018-AA56-1449D5B996A5}" type="datetimeFigureOut">
               <a:rPr lang="en-US" smtClean="0"/>
-              <a:t>12/9/2024</a:t>
+              <a:t>12/10/2024</a:t>
             </a:fld>
             <a:endParaRPr lang="en-US"/>
           </a:p>
@@ -1921,7 +1928,7 @@
           <a:p>
             <a:fld id="{A82FF8FB-BF00-4018-AA56-1449D5B996A5}" type="datetimeFigureOut">
               <a:rPr lang="en-US" smtClean="0"/>
-              <a:t>12/9/2024</a:t>
+              <a:t>12/10/2024</a:t>
             </a:fld>
             <a:endParaRPr lang="en-US"/>
           </a:p>
@@ -2119,7 +2126,7 @@
           <a:p>
             <a:fld id="{A82FF8FB-BF00-4018-AA56-1449D5B996A5}" type="datetimeFigureOut">
               <a:rPr lang="en-US" smtClean="0"/>
-              <a:t>12/9/2024</a:t>
+              <a:t>12/10/2024</a:t>
             </a:fld>
             <a:endParaRPr lang="en-US"/>
           </a:p>
@@ -2394,7 +2401,7 @@
           <a:p>
             <a:fld id="{A82FF8FB-BF00-4018-AA56-1449D5B996A5}" type="datetimeFigureOut">
               <a:rPr lang="en-US" smtClean="0"/>
-              <a:t>12/9/2024</a:t>
+              <a:t>12/10/2024</a:t>
             </a:fld>
             <a:endParaRPr lang="en-US"/>
           </a:p>
@@ -2659,7 +2666,7 @@
           <a:p>
             <a:fld id="{A82FF8FB-BF00-4018-AA56-1449D5B996A5}" type="datetimeFigureOut">
               <a:rPr lang="en-US" smtClean="0"/>
-              <a:t>12/9/2024</a:t>
+              <a:t>12/10/2024</a:t>
             </a:fld>
             <a:endParaRPr lang="en-US"/>
           </a:p>
@@ -3071,7 +3078,7 @@
           <a:p>
             <a:fld id="{A82FF8FB-BF00-4018-AA56-1449D5B996A5}" type="datetimeFigureOut">
               <a:rPr lang="en-US" smtClean="0"/>
-              <a:t>12/9/2024</a:t>
+              <a:t>12/10/2024</a:t>
             </a:fld>
             <a:endParaRPr lang="en-US"/>
           </a:p>
@@ -3212,7 +3219,7 @@
           <a:p>
             <a:fld id="{A82FF8FB-BF00-4018-AA56-1449D5B996A5}" type="datetimeFigureOut">
               <a:rPr lang="en-US" smtClean="0"/>
-              <a:t>12/9/2024</a:t>
+              <a:t>12/10/2024</a:t>
             </a:fld>
             <a:endParaRPr lang="en-US"/>
           </a:p>
@@ -3325,7 +3332,7 @@
           <a:p>
             <a:fld id="{A82FF8FB-BF00-4018-AA56-1449D5B996A5}" type="datetimeFigureOut">
               <a:rPr lang="en-US" smtClean="0"/>
-              <a:t>12/9/2024</a:t>
+              <a:t>12/10/2024</a:t>
             </a:fld>
             <a:endParaRPr lang="en-US"/>
           </a:p>
@@ -3636,7 +3643,7 @@
           <a:p>
             <a:fld id="{A82FF8FB-BF00-4018-AA56-1449D5B996A5}" type="datetimeFigureOut">
               <a:rPr lang="en-US" smtClean="0"/>
-              <a:t>12/9/2024</a:t>
+              <a:t>12/10/2024</a:t>
             </a:fld>
             <a:endParaRPr lang="en-US"/>
           </a:p>
@@ -3924,7 +3931,7 @@
           <a:p>
             <a:fld id="{A82FF8FB-BF00-4018-AA56-1449D5B996A5}" type="datetimeFigureOut">
               <a:rPr lang="en-US" smtClean="0"/>
-              <a:t>12/9/2024</a:t>
+              <a:t>12/10/2024</a:t>
             </a:fld>
             <a:endParaRPr lang="en-US"/>
           </a:p>
@@ -4165,7 +4172,7 @@
           <a:p>
             <a:fld id="{A82FF8FB-BF00-4018-AA56-1449D5B996A5}" type="datetimeFigureOut">
               <a:rPr lang="en-US" smtClean="0"/>
-              <a:t>12/9/2024</a:t>
+              <a:t>12/10/2024</a:t>
             </a:fld>
             <a:endParaRPr lang="en-US"/>
           </a:p>
@@ -16579,6 +16586,323 @@
 <file path=ppt/slides/slide11.xml><?xml version="1.0" encoding="utf-8"?>
 <p:sld xmlns:a="http://schemas.openxmlformats.org/drawingml/2006/main" xmlns:r="http://schemas.openxmlformats.org/officeDocument/2006/relationships" xmlns:p="http://schemas.openxmlformats.org/presentationml/2006/main">
   <p:cSld>
+    <p:spTree>
+      <p:nvGrpSpPr>
+        <p:cNvPr id="1" name=""/>
+        <p:cNvGrpSpPr/>
+        <p:nvPr/>
+      </p:nvGrpSpPr>
+      <p:grpSpPr>
+        <a:xfrm>
+          <a:off x="0" y="0"/>
+          <a:ext cx="0" cy="0"/>
+          <a:chOff x="0" y="0"/>
+          <a:chExt cx="0" cy="0"/>
+        </a:xfrm>
+      </p:grpSpPr>
+      <p:sp>
+        <p:nvSpPr>
+          <p:cNvPr id="4" name="Title 3">
+            <a:extLst>
+              <a:ext uri="{FF2B5EF4-FFF2-40B4-BE49-F238E27FC236}">
+                <a16:creationId xmlns:a16="http://schemas.microsoft.com/office/drawing/2014/main" id="{3A816A1F-926A-8AED-6A59-B4406D5A22A1}"/>
+              </a:ext>
+            </a:extLst>
+          </p:cNvPr>
+          <p:cNvSpPr>
+            <a:spLocks noGrp="1"/>
+          </p:cNvSpPr>
+          <p:nvPr>
+            <p:ph type="title"/>
+          </p:nvPr>
+        </p:nvSpPr>
+        <p:spPr>
+          <a:xfrm>
+            <a:off x="864726" y="2277687"/>
+            <a:ext cx="3932237" cy="1151313"/>
+          </a:xfrm>
+        </p:spPr>
+        <p:txBody>
+          <a:bodyPr/>
+          <a:lstStyle/>
+          <a:p>
+            <a:r>
+              <a:rPr lang="en-US" dirty="0"/>
+              <a:t>Appointment table creation</a:t>
+            </a:r>
+          </a:p>
+        </p:txBody>
+      </p:sp>
+      <p:sp>
+        <p:nvSpPr>
+          <p:cNvPr id="6" name="Text Placeholder 5">
+            <a:extLst>
+              <a:ext uri="{FF2B5EF4-FFF2-40B4-BE49-F238E27FC236}">
+                <a16:creationId xmlns:a16="http://schemas.microsoft.com/office/drawing/2014/main" id="{3DCF2CEA-85F7-6EF2-61CB-CB72875748AB}"/>
+              </a:ext>
+            </a:extLst>
+          </p:cNvPr>
+          <p:cNvSpPr>
+            <a:spLocks noGrp="1"/>
+          </p:cNvSpPr>
+          <p:nvPr>
+            <p:ph type="body" sz="half" idx="2"/>
+          </p:nvPr>
+        </p:nvSpPr>
+        <p:spPr>
+          <a:xfrm>
+            <a:off x="864726" y="3429001"/>
+            <a:ext cx="3932237" cy="777240"/>
+          </a:xfrm>
+        </p:spPr>
+        <p:txBody>
+          <a:bodyPr/>
+          <a:lstStyle/>
+          <a:p>
+            <a:r>
+              <a:rPr lang="en-US"/>
+              <a:t>Generated by means of the Forward Engineer of the ERD model.</a:t>
+            </a:r>
+            <a:endParaRPr lang="en-US" dirty="0"/>
+          </a:p>
+        </p:txBody>
+      </p:sp>
+      <p:pic>
+        <p:nvPicPr>
+          <p:cNvPr id="7" name="Content Placeholder 5">
+            <a:extLst>
+              <a:ext uri="{FF2B5EF4-FFF2-40B4-BE49-F238E27FC236}">
+                <a16:creationId xmlns:a16="http://schemas.microsoft.com/office/drawing/2014/main" id="{C77A1B5A-8A4C-D34F-934B-F7DCFB0D9EBB}"/>
+              </a:ext>
+            </a:extLst>
+          </p:cNvPr>
+          <p:cNvPicPr>
+            <a:picLocks noGrp="1" noChangeAspect="1"/>
+          </p:cNvPicPr>
+          <p:nvPr>
+            <p:ph idx="1"/>
+          </p:nvPr>
+        </p:nvPicPr>
+        <p:blipFill>
+          <a:blip r:embed="rId2"/>
+          <a:stretch>
+            <a:fillRect/>
+          </a:stretch>
+        </p:blipFill>
+        <p:spPr>
+          <a:xfrm>
+            <a:off x="5635786" y="152320"/>
+            <a:ext cx="6351998" cy="6553359"/>
+          </a:xfrm>
+          <a:prstGeom prst="rect">
+            <a:avLst/>
+          </a:prstGeom>
+          <a:solidFill>
+            <a:srgbClr val="FFFFFF">
+              <a:shade val="85000"/>
+            </a:srgbClr>
+          </a:solidFill>
+          <a:ln w="88900" cap="sq">
+            <a:solidFill>
+              <a:srgbClr val="FFFFFF"/>
+            </a:solidFill>
+            <a:miter lim="800000"/>
+          </a:ln>
+          <a:effectLst>
+            <a:outerShdw blurRad="55000" dist="18000" dir="5400000" algn="tl" rotWithShape="0">
+              <a:srgbClr val="000000">
+                <a:alpha val="40000"/>
+              </a:srgbClr>
+            </a:outerShdw>
+          </a:effectLst>
+          <a:scene3d>
+            <a:camera prst="orthographicFront"/>
+            <a:lightRig rig="twoPt" dir="t">
+              <a:rot lat="0" lon="0" rev="7200000"/>
+            </a:lightRig>
+          </a:scene3d>
+          <a:sp3d>
+            <a:bevelT w="25400" h="19050"/>
+            <a:contourClr>
+              <a:srgbClr val="FFFFFF"/>
+            </a:contourClr>
+          </a:sp3d>
+        </p:spPr>
+      </p:pic>
+    </p:spTree>
+    <p:extLst>
+      <p:ext uri="{BB962C8B-B14F-4D97-AF65-F5344CB8AC3E}">
+        <p14:creationId xmlns:p14="http://schemas.microsoft.com/office/powerpoint/2010/main" val="3852046895"/>
+      </p:ext>
+    </p:extLst>
+  </p:cSld>
+  <p:clrMapOvr>
+    <a:masterClrMapping/>
+  </p:clrMapOvr>
+</p:sld>
+</file>
+
+<file path=ppt/slides/slide12.xml><?xml version="1.0" encoding="utf-8"?>
+<p:sld xmlns:a="http://schemas.openxmlformats.org/drawingml/2006/main" xmlns:r="http://schemas.openxmlformats.org/officeDocument/2006/relationships" xmlns:p="http://schemas.openxmlformats.org/presentationml/2006/main">
+  <p:cSld>
+    <p:spTree>
+      <p:nvGrpSpPr>
+        <p:cNvPr id="1" name=""/>
+        <p:cNvGrpSpPr/>
+        <p:nvPr/>
+      </p:nvGrpSpPr>
+      <p:grpSpPr>
+        <a:xfrm>
+          <a:off x="0" y="0"/>
+          <a:ext cx="0" cy="0"/>
+          <a:chOff x="0" y="0"/>
+          <a:chExt cx="0" cy="0"/>
+        </a:xfrm>
+      </p:grpSpPr>
+      <p:pic>
+        <p:nvPicPr>
+          <p:cNvPr id="10" name="Picture 9">
+            <a:extLst>
+              <a:ext uri="{FF2B5EF4-FFF2-40B4-BE49-F238E27FC236}">
+                <a16:creationId xmlns:a16="http://schemas.microsoft.com/office/drawing/2014/main" id="{5D309C1F-5A40-1708-D12F-0717E97BE769}"/>
+              </a:ext>
+            </a:extLst>
+          </p:cNvPr>
+          <p:cNvPicPr>
+            <a:picLocks noChangeAspect="1"/>
+          </p:cNvPicPr>
+          <p:nvPr/>
+        </p:nvPicPr>
+        <p:blipFill>
+          <a:blip r:embed="rId2"/>
+          <a:stretch>
+            <a:fillRect/>
+          </a:stretch>
+        </p:blipFill>
+        <p:spPr>
+          <a:xfrm>
+            <a:off x="1363527" y="1633869"/>
+            <a:ext cx="9464945" cy="5127251"/>
+          </a:xfrm>
+          <a:prstGeom prst="rect">
+            <a:avLst/>
+          </a:prstGeom>
+          <a:solidFill>
+            <a:srgbClr val="FFFFFF">
+              <a:shade val="85000"/>
+            </a:srgbClr>
+          </a:solidFill>
+          <a:ln w="88900" cap="sq">
+            <a:solidFill>
+              <a:srgbClr val="FFFFFF"/>
+            </a:solidFill>
+            <a:miter lim="800000"/>
+          </a:ln>
+          <a:effectLst>
+            <a:outerShdw blurRad="55000" dist="18000" dir="5400000" algn="tl" rotWithShape="0">
+              <a:srgbClr val="000000">
+                <a:alpha val="40000"/>
+              </a:srgbClr>
+            </a:outerShdw>
+          </a:effectLst>
+          <a:scene3d>
+            <a:camera prst="orthographicFront"/>
+            <a:lightRig rig="twoPt" dir="t">
+              <a:rot lat="0" lon="0" rev="7200000"/>
+            </a:lightRig>
+          </a:scene3d>
+          <a:sp3d>
+            <a:bevelT w="25400" h="19050"/>
+            <a:contourClr>
+              <a:srgbClr val="FFFFFF"/>
+            </a:contourClr>
+          </a:sp3d>
+        </p:spPr>
+      </p:pic>
+      <p:sp>
+        <p:nvSpPr>
+          <p:cNvPr id="13" name="Title 1">
+            <a:extLst>
+              <a:ext uri="{FF2B5EF4-FFF2-40B4-BE49-F238E27FC236}">
+                <a16:creationId xmlns:a16="http://schemas.microsoft.com/office/drawing/2014/main" id="{F447DDE6-0588-7BC4-1420-8691DA6E6D2C}"/>
+              </a:ext>
+            </a:extLst>
+          </p:cNvPr>
+          <p:cNvSpPr>
+            <a:spLocks noGrp="1"/>
+          </p:cNvSpPr>
+          <p:nvPr>
+            <p:ph type="title"/>
+          </p:nvPr>
+        </p:nvSpPr>
+        <p:spPr>
+          <a:xfrm>
+            <a:off x="1363527" y="141219"/>
+            <a:ext cx="5868510" cy="697047"/>
+          </a:xfrm>
+        </p:spPr>
+        <p:txBody>
+          <a:bodyPr/>
+          <a:lstStyle/>
+          <a:p>
+            <a:r>
+              <a:rPr lang="en-US" dirty="0"/>
+              <a:t>Appointment inserts</a:t>
+            </a:r>
+          </a:p>
+        </p:txBody>
+      </p:sp>
+      <p:sp>
+        <p:nvSpPr>
+          <p:cNvPr id="14" name="Text Placeholder 3">
+            <a:extLst>
+              <a:ext uri="{FF2B5EF4-FFF2-40B4-BE49-F238E27FC236}">
+                <a16:creationId xmlns:a16="http://schemas.microsoft.com/office/drawing/2014/main" id="{96F419E6-A1C1-3332-8ADE-B9855C34B6DC}"/>
+              </a:ext>
+            </a:extLst>
+          </p:cNvPr>
+          <p:cNvSpPr>
+            <a:spLocks noGrp="1"/>
+          </p:cNvSpPr>
+          <p:nvPr>
+            <p:ph type="body" sz="half" idx="2"/>
+          </p:nvPr>
+        </p:nvSpPr>
+        <p:spPr>
+          <a:xfrm>
+            <a:off x="1363527" y="887090"/>
+            <a:ext cx="9464945" cy="697047"/>
+          </a:xfrm>
+        </p:spPr>
+        <p:txBody>
+          <a:bodyPr>
+            <a:noAutofit/>
+          </a:bodyPr>
+          <a:lstStyle/>
+          <a:p>
+            <a:r>
+              <a:rPr lang="en-US" sz="2000" dirty="0"/>
+              <a:t>Note¹ – Depends on insertions for person table being run beforehand, i.e., order of the inserts matters.</a:t>
+            </a:r>
+          </a:p>
+        </p:txBody>
+      </p:sp>
+    </p:spTree>
+    <p:extLst>
+      <p:ext uri="{BB962C8B-B14F-4D97-AF65-F5344CB8AC3E}">
+        <p14:creationId xmlns:p14="http://schemas.microsoft.com/office/powerpoint/2010/main" val="1609578984"/>
+      </p:ext>
+    </p:extLst>
+  </p:cSld>
+  <p:clrMapOvr>
+    <a:masterClrMapping/>
+  </p:clrMapOvr>
+</p:sld>
+</file>
+
+<file path=ppt/slides/slide13.xml><?xml version="1.0" encoding="utf-8"?>
+<p:sld xmlns:a="http://schemas.openxmlformats.org/drawingml/2006/main" xmlns:r="http://schemas.openxmlformats.org/officeDocument/2006/relationships" xmlns:p="http://schemas.openxmlformats.org/presentationml/2006/main">
+  <p:cSld>
     <p:bg>
       <p:bgPr>
         <a:solidFill>
@@ -16860,7 +17184,7 @@
 </p:sld>
 </file>
 
-<file path=ppt/slides/slide12.xml><?xml version="1.0" encoding="utf-8"?>
+<file path=ppt/slides/slide14.xml><?xml version="1.0" encoding="utf-8"?>
 <p:sld xmlns:a="http://schemas.openxmlformats.org/drawingml/2006/main" xmlns:r="http://schemas.openxmlformats.org/officeDocument/2006/relationships" xmlns:p="http://schemas.openxmlformats.org/presentationml/2006/main">
   <p:cSld>
     <p:spTree>
@@ -17036,7 +17360,7 @@
 </p:sld>
 </file>
 
-<file path=ppt/slides/slide13.xml><?xml version="1.0" encoding="utf-8"?>
+<file path=ppt/slides/slide15.xml><?xml version="1.0" encoding="utf-8"?>
 <p:sld xmlns:a="http://schemas.openxmlformats.org/drawingml/2006/main" xmlns:r="http://schemas.openxmlformats.org/officeDocument/2006/relationships" xmlns:p="http://schemas.openxmlformats.org/presentationml/2006/main">
   <p:cSld>
     <p:bg>

</xml_diff>